<commit_message>
Changes to the PPT after our call
</commit_message>
<xml_diff>
--- a/presentation/Disaster_Relief_Sim_PPT.pptx
+++ b/presentation/Disaster_Relief_Sim_PPT.pptx
@@ -5,7 +5,7 @@
     <p:sldMasterId id="2147483660" r:id="rId1"/>
   </p:sldMasterIdLst>
   <p:notesMasterIdLst>
-    <p:notesMasterId r:id="rId13"/>
+    <p:notesMasterId r:id="rId14"/>
   </p:notesMasterIdLst>
   <p:sldIdLst>
     <p:sldId id="256" r:id="rId2"/>
@@ -19,6 +19,7 @@
     <p:sldId id="261" r:id="rId10"/>
     <p:sldId id="262" r:id="rId11"/>
     <p:sldId id="266" r:id="rId12"/>
+    <p:sldId id="267" r:id="rId13"/>
   </p:sldIdLst>
   <p:sldSz cx="9144000" cy="6858000" type="screen4x3"/>
   <p:notesSz cx="6858000" cy="9144000"/>
@@ -202,7 +203,7 @@
           <a:p>
             <a:fld id="{A81C772C-0ACD-E941-9049-54B75BFF43E0}" type="datetimeFigureOut">
               <a:rPr lang="en-US" smtClean="0"/>
-              <a:t>11/05/16</a:t>
+              <a:t>12/05/16</a:t>
             </a:fld>
             <a:endParaRPr lang="en-US" dirty="0"/>
           </a:p>
@@ -924,7 +925,7 @@
           <a:p>
             <a:fld id="{651A0C47-018D-4460-B945-BFF7981B6CA6}" type="datetimeFigureOut">
               <a:rPr lang="en-US" smtClean="0"/>
-              <a:t>11/05/16</a:t>
+              <a:t>12/05/16</a:t>
             </a:fld>
             <a:endParaRPr lang="en-US" dirty="0"/>
           </a:p>
@@ -1256,7 +1257,7 @@
           <a:p>
             <a:fld id="{651A0C47-018D-4460-B945-BFF7981B6CA6}" type="datetimeFigureOut">
               <a:rPr lang="en-US" smtClean="0"/>
-              <a:t>11/05/16</a:t>
+              <a:t>12/05/16</a:t>
             </a:fld>
             <a:endParaRPr lang="en-US" dirty="0"/>
           </a:p>
@@ -1588,7 +1589,7 @@
           <a:p>
             <a:fld id="{651A0C47-018D-4460-B945-BFF7981B6CA6}" type="datetimeFigureOut">
               <a:rPr lang="en-US" smtClean="0"/>
-              <a:t>11/05/16</a:t>
+              <a:t>12/05/16</a:t>
             </a:fld>
             <a:endParaRPr lang="en-US" dirty="0"/>
           </a:p>
@@ -1920,7 +1921,7 @@
           <a:p>
             <a:fld id="{651A0C47-018D-4460-B945-BFF7981B6CA6}" type="datetimeFigureOut">
               <a:rPr lang="en-US" smtClean="0"/>
-              <a:t>11/05/16</a:t>
+              <a:t>12/05/16</a:t>
             </a:fld>
             <a:endParaRPr lang="en-US" dirty="0"/>
           </a:p>
@@ -2609,7 +2610,7 @@
           <a:p>
             <a:fld id="{651A0C47-018D-4460-B945-BFF7981B6CA6}" type="datetimeFigureOut">
               <a:rPr lang="en-US" smtClean="0"/>
-              <a:t>11/05/16</a:t>
+              <a:t>12/05/16</a:t>
             </a:fld>
             <a:endParaRPr lang="en-US" dirty="0"/>
           </a:p>
@@ -2788,7 +2789,7 @@
           <a:p>
             <a:fld id="{651A0C47-018D-4460-B945-BFF7981B6CA6}" type="datetimeFigureOut">
               <a:rPr lang="en-US" smtClean="0"/>
-              <a:t>11/05/16</a:t>
+              <a:t>12/05/16</a:t>
             </a:fld>
             <a:endParaRPr lang="en-US" dirty="0"/>
           </a:p>
@@ -2962,7 +2963,7 @@
           <a:p>
             <a:fld id="{651A0C47-018D-4460-B945-BFF7981B6CA6}" type="datetimeFigureOut">
               <a:rPr lang="en-US" smtClean="0"/>
-              <a:t>11/05/16</a:t>
+              <a:t>12/05/16</a:t>
             </a:fld>
             <a:endParaRPr lang="en-US" dirty="0"/>
           </a:p>
@@ -3210,7 +3211,7 @@
           <a:p>
             <a:fld id="{651A0C47-018D-4460-B945-BFF7981B6CA6}" type="datetimeFigureOut">
               <a:rPr lang="en-US" smtClean="0"/>
-              <a:t>11/05/16</a:t>
+              <a:t>12/05/16</a:t>
             </a:fld>
             <a:endParaRPr lang="en-US" dirty="0"/>
           </a:p>
@@ -3540,7 +3541,7 @@
           <a:p>
             <a:fld id="{651A0C47-018D-4460-B945-BFF7981B6CA6}" type="datetimeFigureOut">
               <a:rPr lang="en-US" smtClean="0"/>
-              <a:t>11/05/16</a:t>
+              <a:t>12/05/16</a:t>
             </a:fld>
             <a:endParaRPr lang="en-US" dirty="0"/>
           </a:p>
@@ -3832,7 +3833,7 @@
           <a:p>
             <a:fld id="{651A0C47-018D-4460-B945-BFF7981B6CA6}" type="datetimeFigureOut">
               <a:rPr lang="en-US" smtClean="0"/>
-              <a:t>11/05/16</a:t>
+              <a:t>12/05/16</a:t>
             </a:fld>
             <a:endParaRPr lang="en-US" dirty="0"/>
           </a:p>
@@ -4268,7 +4269,7 @@
           <a:p>
             <a:fld id="{651A0C47-018D-4460-B945-BFF7981B6CA6}" type="datetimeFigureOut">
               <a:rPr lang="en-US" smtClean="0"/>
-              <a:t>11/05/16</a:t>
+              <a:t>12/05/16</a:t>
             </a:fld>
             <a:endParaRPr lang="en-US" dirty="0"/>
           </a:p>
@@ -4455,7 +4456,7 @@
           <a:p>
             <a:fld id="{651A0C47-018D-4460-B945-BFF7981B6CA6}" type="datetimeFigureOut">
               <a:rPr lang="en-US" smtClean="0"/>
-              <a:t>11/05/16</a:t>
+              <a:t>12/05/16</a:t>
             </a:fld>
             <a:endParaRPr lang="en-US" dirty="0"/>
           </a:p>
@@ -4545,7 +4546,7 @@
           <a:p>
             <a:fld id="{651A0C47-018D-4460-B945-BFF7981B6CA6}" type="datetimeFigureOut">
               <a:rPr lang="en-US" smtClean="0"/>
-              <a:t>11/05/16</a:t>
+              <a:t>12/05/16</a:t>
             </a:fld>
             <a:endParaRPr lang="en-US" dirty="0"/>
           </a:p>
@@ -4826,7 +4827,7 @@
           <a:p>
             <a:fld id="{651A0C47-018D-4460-B945-BFF7981B6CA6}" type="datetimeFigureOut">
               <a:rPr lang="en-US" smtClean="0"/>
-              <a:t>11/05/16</a:t>
+              <a:t>12/05/16</a:t>
             </a:fld>
             <a:endParaRPr lang="en-US" dirty="0"/>
           </a:p>
@@ -5041,7 +5042,7 @@
           <a:p>
             <a:fld id="{651A0C47-018D-4460-B945-BFF7981B6CA6}" type="datetimeFigureOut">
               <a:rPr lang="en-US" smtClean="0"/>
-              <a:t>11/05/16</a:t>
+              <a:t>12/05/16</a:t>
             </a:fld>
             <a:endParaRPr lang="en-US" dirty="0"/>
           </a:p>
@@ -5566,11 +5567,7 @@
           <a:p>
             <a:r>
               <a:rPr lang="en-US" dirty="0" smtClean="0"/>
-              <a:t>A Simulation in </a:t>
-            </a:r>
-            <a:r>
-              <a:rPr lang="en-US" dirty="0" smtClean="0"/>
-              <a:t>Simio</a:t>
+              <a:t>A Simulation in Simio</a:t>
             </a:r>
             <a:endParaRPr lang="en-US" dirty="0"/>
           </a:p>
@@ -5701,8 +5698,32 @@
             <a:pPr lvl="1"/>
             <a:r>
               <a:rPr lang="en-US" dirty="0" smtClean="0"/>
-              <a:t>Breakdown of vehicles == loss of supplies in transit</a:t>
-            </a:r>
+              <a:t>Breakdown of vehicles </a:t>
+            </a:r>
+            <a:r>
+              <a:rPr lang="en-US" dirty="0" smtClean="0"/>
+              <a:t>== delay of arrival of supplies</a:t>
+            </a:r>
+          </a:p>
+          <a:p>
+            <a:pPr lvl="1"/>
+            <a:r>
+              <a:rPr lang="en-US" dirty="0"/>
+              <a:t>L</a:t>
+            </a:r>
+            <a:r>
+              <a:rPr lang="en-US" dirty="0" smtClean="0"/>
+              <a:t>oss </a:t>
+            </a:r>
+            <a:r>
+              <a:rPr lang="en-US" dirty="0" smtClean="0"/>
+              <a:t>of supplies in </a:t>
+            </a:r>
+            <a:r>
+              <a:rPr lang="en-US" dirty="0" smtClean="0"/>
+              <a:t>transit?</a:t>
+            </a:r>
+            <a:endParaRPr lang="en-US" dirty="0" smtClean="0"/>
           </a:p>
           <a:p>
             <a:r>
@@ -5852,7 +5873,18 @@
           <a:p>
             <a:r>
               <a:rPr lang="en-US" dirty="0" smtClean="0"/>
-              <a:t>Supplies distributed</a:t>
+              <a:t>Supplies </a:t>
+            </a:r>
+            <a:r>
+              <a:rPr lang="en-US" dirty="0" smtClean="0"/>
+              <a:t>distributed </a:t>
+            </a:r>
+          </a:p>
+          <a:p>
+            <a:pPr lvl="1"/>
+            <a:r>
+              <a:rPr lang="en-US" dirty="0" smtClean="0"/>
+              <a:t>(Number destroyed == Number distributed)</a:t>
             </a:r>
             <a:endParaRPr lang="en-US" dirty="0"/>
           </a:p>
@@ -5862,6 +5894,78 @@
     <p:extLst>
       <p:ext uri="{BB962C8B-B14F-4D97-AF65-F5344CB8AC3E}">
         <p14:creationId xmlns:p14="http://schemas.microsoft.com/office/powerpoint/2010/main" val="3546670693"/>
+      </p:ext>
+    </p:extLst>
+  </p:cSld>
+  <p:clrMapOvr>
+    <a:masterClrMapping/>
+  </p:clrMapOvr>
+</p:sld>
+</file>
+
+<file path=ppt/slides/slide12.xml><?xml version="1.0" encoding="utf-8"?>
+<p:sld xmlns:a="http://schemas.openxmlformats.org/drawingml/2006/main" xmlns:r="http://schemas.openxmlformats.org/officeDocument/2006/relationships" xmlns:p="http://schemas.openxmlformats.org/presentationml/2006/main">
+  <p:cSld>
+    <p:spTree>
+      <p:nvGrpSpPr>
+        <p:cNvPr id="1" name=""/>
+        <p:cNvGrpSpPr/>
+        <p:nvPr/>
+      </p:nvGrpSpPr>
+      <p:grpSpPr>
+        <a:xfrm>
+          <a:off x="0" y="0"/>
+          <a:ext cx="0" cy="0"/>
+          <a:chOff x="0" y="0"/>
+          <a:chExt cx="0" cy="0"/>
+        </a:xfrm>
+      </p:grpSpPr>
+      <p:sp>
+        <p:nvSpPr>
+          <p:cNvPr id="2" name="Title 1"/>
+          <p:cNvSpPr>
+            <a:spLocks noGrp="1"/>
+          </p:cNvSpPr>
+          <p:nvPr>
+            <p:ph type="title"/>
+          </p:nvPr>
+        </p:nvSpPr>
+        <p:spPr/>
+        <p:txBody>
+          <a:bodyPr/>
+          <a:lstStyle/>
+          <a:p>
+            <a:r>
+              <a:rPr lang="en-US" smtClean="0"/>
+              <a:t>Results</a:t>
+            </a:r>
+            <a:endParaRPr lang="en-US"/>
+          </a:p>
+        </p:txBody>
+      </p:sp>
+      <p:sp>
+        <p:nvSpPr>
+          <p:cNvPr id="3" name="Content Placeholder 2"/>
+          <p:cNvSpPr>
+            <a:spLocks noGrp="1"/>
+          </p:cNvSpPr>
+          <p:nvPr>
+            <p:ph idx="1"/>
+          </p:nvPr>
+        </p:nvSpPr>
+        <p:spPr/>
+        <p:txBody>
+          <a:bodyPr/>
+          <a:lstStyle/>
+          <a:p>
+            <a:endParaRPr lang="en-US"/>
+          </a:p>
+        </p:txBody>
+      </p:sp>
+    </p:spTree>
+    <p:extLst>
+      <p:ext uri="{BB962C8B-B14F-4D97-AF65-F5344CB8AC3E}">
+        <p14:creationId xmlns:p14="http://schemas.microsoft.com/office/powerpoint/2010/main" val="1716675666"/>
       </p:ext>
     </p:extLst>
   </p:cSld>
@@ -5965,15 +6069,7 @@
           <a:p>
             <a:r>
               <a:rPr lang="en-US" dirty="0" smtClean="0"/>
-              <a:t>Daniel </a:t>
-            </a:r>
-            <a:r>
-              <a:rPr lang="en-US" dirty="0" smtClean="0"/>
-              <a:t>Dittenhafer</a:t>
-            </a:r>
-            <a:r>
-              <a:rPr lang="en-US" dirty="0" smtClean="0"/>
-              <a:t> </a:t>
+              <a:t>Daniel Dittenhafer </a:t>
             </a:r>
             <a:endParaRPr lang="en-US" dirty="0"/>
           </a:p>

</xml_diff>

<commit_message>
Sorry - checking in the right PPT after our call
</commit_message>
<xml_diff>
--- a/presentation/Disaster_Relief_Sim_PPT.pptx
+++ b/presentation/Disaster_Relief_Sim_PPT.pptx
@@ -5698,32 +5698,8 @@
             <a:pPr lvl="1"/>
             <a:r>
               <a:rPr lang="en-US" dirty="0" smtClean="0"/>
-              <a:t>Breakdown of vehicles </a:t>
-            </a:r>
-            <a:r>
-              <a:rPr lang="en-US" dirty="0" smtClean="0"/>
-              <a:t>== delay of arrival of supplies</a:t>
-            </a:r>
-          </a:p>
-          <a:p>
-            <a:pPr lvl="1"/>
-            <a:r>
-              <a:rPr lang="en-US" dirty="0"/>
-              <a:t>L</a:t>
-            </a:r>
-            <a:r>
-              <a:rPr lang="en-US" dirty="0" smtClean="0"/>
-              <a:t>oss </a:t>
-            </a:r>
-            <a:r>
-              <a:rPr lang="en-US" dirty="0" smtClean="0"/>
-              <a:t>of supplies in </a:t>
-            </a:r>
-            <a:r>
-              <a:rPr lang="en-US" dirty="0" smtClean="0"/>
-              <a:t>transit?</a:t>
-            </a:r>
-            <a:endParaRPr lang="en-US" dirty="0" smtClean="0"/>
+              <a:t>Breakdown of vehicles == delay of arrival of supplies</a:t>
+            </a:r>
           </a:p>
           <a:p>
             <a:r>
@@ -5863,8 +5839,17 @@
             <a:pPr lvl="1"/>
             <a:r>
               <a:rPr lang="en-US" dirty="0"/>
-              <a:t>Relief Supplies – Implications on perishable supplies</a:t>
-            </a:r>
+              <a:t>Relief Supplies – Implications on </a:t>
+            </a:r>
+            <a:r>
+              <a:rPr lang="en-US"/>
+              <a:t>perishable </a:t>
+            </a:r>
+            <a:r>
+              <a:rPr lang="en-US" smtClean="0"/>
+              <a:t>supplies </a:t>
+            </a:r>
+            <a:endParaRPr lang="en-US" dirty="0"/>
           </a:p>
           <a:p>
             <a:pPr lvl="1"/>
@@ -5873,11 +5858,7 @@
           <a:p>
             <a:r>
               <a:rPr lang="en-US" dirty="0" smtClean="0"/>
-              <a:t>Supplies </a:t>
-            </a:r>
-            <a:r>
-              <a:rPr lang="en-US" dirty="0" smtClean="0"/>
-              <a:t>distributed </a:t>
+              <a:t>Supplies distributed </a:t>
             </a:r>
           </a:p>
           <a:p>
@@ -5936,10 +5917,10 @@
           <a:lstStyle/>
           <a:p>
             <a:r>
-              <a:rPr lang="en-US" smtClean="0"/>
+              <a:rPr lang="en-US" dirty="0" smtClean="0"/>
               <a:t>Results</a:t>
             </a:r>
-            <a:endParaRPr lang="en-US"/>
+            <a:endParaRPr lang="en-US" dirty="0"/>
           </a:p>
         </p:txBody>
       </p:sp>

</xml_diff>